<commit_message>
2023-11-02 CS 세미나 백업
</commit_message>
<xml_diff>
--- a/ppt 모음/RL Part1.pptx
+++ b/ppt 모음/RL Part1.pptx
@@ -5,7 +5,7 @@
     <p:sldMasterId id="2147483750" r:id="rId1"/>
   </p:sldMasterIdLst>
   <p:notesMasterIdLst>
-    <p:notesMasterId r:id="rId16"/>
+    <p:notesMasterId r:id="rId17"/>
   </p:notesMasterIdLst>
   <p:sldIdLst>
     <p:sldId id="256" r:id="rId2"/>
@@ -21,7 +21,8 @@
     <p:sldId id="267" r:id="rId12"/>
     <p:sldId id="268" r:id="rId13"/>
     <p:sldId id="269" r:id="rId14"/>
-    <p:sldId id="257" r:id="rId15"/>
+    <p:sldId id="270" r:id="rId15"/>
+    <p:sldId id="257" r:id="rId16"/>
   </p:sldIdLst>
   <p:sldSz cx="9144000" cy="6858000" type="screen4x3"/>
   <p:notesSz cx="6797675" cy="9874250"/>
@@ -278,7 +279,7 @@
           <a:p>
             <a:fld id="{57764B8E-7EC0-4B59-8DA5-E04CAE3DB5F2}" type="datetimeFigureOut">
               <a:rPr lang="ko-KR" altLang="en-US" smtClean="0"/>
-              <a:t>2023-10-25</a:t>
+              <a:t>2023-10-26</a:t>
             </a:fld>
             <a:endParaRPr lang="ko-KR" altLang="en-US"/>
           </a:p>
@@ -4300,7 +4301,7 @@
           <a:p>
             <a:r>
               <a:rPr lang="en-US" altLang="ko-KR" dirty="0"/>
-              <a:t>21.07.01</a:t>
+              <a:t>23.10.26</a:t>
             </a:r>
             <a:endParaRPr lang="ko-KR" altLang="en-US" dirty="0"/>
           </a:p>
@@ -5113,6 +5114,212 @@
 </file>
 
 <file path=ppt/slides/slide14.xml><?xml version="1.0" encoding="utf-8"?>
+<p:sld xmlns:a="http://schemas.openxmlformats.org/drawingml/2006/main" xmlns:r="http://schemas.openxmlformats.org/officeDocument/2006/relationships" xmlns:p="http://schemas.openxmlformats.org/presentationml/2006/main">
+  <p:cSld>
+    <p:spTree>
+      <p:nvGrpSpPr>
+        <p:cNvPr id="1" name=""/>
+        <p:cNvGrpSpPr/>
+        <p:nvPr/>
+      </p:nvGrpSpPr>
+      <p:grpSpPr>
+        <a:xfrm>
+          <a:off x="0" y="0"/>
+          <a:ext cx="0" cy="0"/>
+          <a:chOff x="0" y="0"/>
+          <a:chExt cx="0" cy="0"/>
+        </a:xfrm>
+      </p:grpSpPr>
+      <p:sp>
+        <p:nvSpPr>
+          <p:cNvPr id="2" name="제목 1">
+            <a:extLst>
+              <a:ext uri="{FF2B5EF4-FFF2-40B4-BE49-F238E27FC236}">
+                <a16:creationId xmlns:a16="http://schemas.microsoft.com/office/drawing/2014/main" id="{67161F12-549B-9F7D-E52E-0B818AF9E9BD}"/>
+              </a:ext>
+            </a:extLst>
+          </p:cNvPr>
+          <p:cNvSpPr>
+            <a:spLocks noGrp="1"/>
+          </p:cNvSpPr>
+          <p:nvPr>
+            <p:ph type="title"/>
+          </p:nvPr>
+        </p:nvSpPr>
+        <p:spPr>
+          <a:xfrm>
+            <a:off x="755650" y="188913"/>
+            <a:ext cx="8137525" cy="647700"/>
+          </a:xfrm>
+        </p:spPr>
+        <p:txBody>
+          <a:bodyPr wrap="square" anchor="ctr">
+            <a:normAutofit/>
+          </a:bodyPr>
+          <a:lstStyle/>
+          <a:p>
+            <a:pPr>
+              <a:lnSpc>
+                <a:spcPct val="90000"/>
+              </a:lnSpc>
+            </a:pPr>
+            <a:r>
+              <a:rPr lang="ko-KR" altLang="en-US" dirty="0"/>
+              <a:t>다음 목표 </a:t>
+            </a:r>
+            <a:r>
+              <a:rPr lang="en-US" altLang="ko-KR" dirty="0"/>
+              <a:t>– </a:t>
+            </a:r>
+            <a:r>
+              <a:rPr lang="ko-KR" altLang="en-US" dirty="0" err="1"/>
+              <a:t>리버시</a:t>
+            </a:r>
+            <a:r>
+              <a:rPr lang="ko-KR" altLang="en-US" dirty="0"/>
+              <a:t> 게임 </a:t>
+            </a:r>
+          </a:p>
+        </p:txBody>
+      </p:sp>
+      <p:sp>
+        <p:nvSpPr>
+          <p:cNvPr id="1033" name="Content Placeholder 3">
+            <a:extLst>
+              <a:ext uri="{FF2B5EF4-FFF2-40B4-BE49-F238E27FC236}">
+                <a16:creationId xmlns:a16="http://schemas.microsoft.com/office/drawing/2014/main" id="{AD127B80-17BF-24B9-BEEB-B92D82CF11EE}"/>
+              </a:ext>
+            </a:extLst>
+          </p:cNvPr>
+          <p:cNvSpPr>
+            <a:spLocks noGrp="1"/>
+          </p:cNvSpPr>
+          <p:nvPr>
+            <p:ph sz="half" idx="2"/>
+          </p:nvPr>
+        </p:nvSpPr>
+        <p:spPr>
+          <a:xfrm>
+            <a:off x="4900613" y="1052513"/>
+            <a:ext cx="3919537" cy="5272087"/>
+          </a:xfrm>
+        </p:spPr>
+        <p:txBody>
+          <a:bodyPr/>
+          <a:lstStyle/>
+          <a:p>
+            <a:r>
+              <a:rPr lang="ko-KR" altLang="en-US" dirty="0"/>
+              <a:t>상대방 돌을 뒤집을 수 있는 곳에만 돌을 둘 수 있음</a:t>
+            </a:r>
+            <a:endParaRPr lang="en-US" altLang="ko-KR" dirty="0"/>
+          </a:p>
+          <a:p>
+            <a:r>
+              <a:rPr lang="ko-KR" altLang="en-US" dirty="0"/>
+              <a:t>상대방 돌을 내 돌</a:t>
+            </a:r>
+            <a:br>
+              <a:rPr lang="en-US" altLang="ko-KR" dirty="0"/>
+            </a:br>
+            <a:r>
+              <a:rPr lang="ko-KR" altLang="en-US" dirty="0"/>
+              <a:t>사이에 끼면 뒤집음</a:t>
+            </a:r>
+            <a:endParaRPr lang="en-US" dirty="0"/>
+          </a:p>
+          <a:p>
+            <a:r>
+              <a:rPr lang="ko-KR" altLang="en-US" dirty="0"/>
+              <a:t>내가 둘 곳이 없고</a:t>
+            </a:r>
+            <a:r>
+              <a:rPr lang="en-US" altLang="ko-KR" dirty="0"/>
+              <a:t>, </a:t>
+            </a:r>
+            <a:br>
+              <a:rPr lang="en-US" altLang="ko-KR" dirty="0"/>
+            </a:br>
+            <a:r>
+              <a:rPr lang="ko-KR" altLang="en-US" dirty="0"/>
+              <a:t>상대방만 둘 곳이 있을 경우 차례가 넘어간다</a:t>
+            </a:r>
+            <a:endParaRPr lang="en-US" altLang="ko-KR" dirty="0"/>
+          </a:p>
+          <a:p>
+            <a:r>
+              <a:rPr lang="ko-KR" altLang="en-US" dirty="0"/>
+              <a:t>둘 다 둘 곳이 없을 때 게임이 종료된다</a:t>
+            </a:r>
+            <a:r>
+              <a:rPr lang="en-US" altLang="ko-KR" dirty="0"/>
+              <a:t>.</a:t>
+            </a:r>
+            <a:endParaRPr lang="en-US" dirty="0"/>
+          </a:p>
+        </p:txBody>
+      </p:sp>
+      <p:pic>
+        <p:nvPicPr>
+          <p:cNvPr id="1030" name="Picture 6">
+            <a:extLst>
+              <a:ext uri="{FF2B5EF4-FFF2-40B4-BE49-F238E27FC236}">
+                <a16:creationId xmlns:a16="http://schemas.microsoft.com/office/drawing/2014/main" id="{B534EB89-8459-2B85-4B53-4016C05475F1}"/>
+              </a:ext>
+            </a:extLst>
+          </p:cNvPr>
+          <p:cNvPicPr>
+            <a:picLocks noChangeAspect="1" noChangeArrowheads="1"/>
+          </p:cNvPicPr>
+          <p:nvPr/>
+        </p:nvPicPr>
+        <p:blipFill>
+          <a:blip r:embed="rId2">
+            <a:extLst>
+              <a:ext uri="{28A0092B-C50C-407E-A947-70E740481C1C}">
+                <a14:useLocalDpi xmlns:a14="http://schemas.microsoft.com/office/drawing/2010/main" val="0"/>
+              </a:ext>
+            </a:extLst>
+          </a:blip>
+          <a:srcRect/>
+          <a:stretch>
+            <a:fillRect/>
+          </a:stretch>
+        </p:blipFill>
+        <p:spPr bwMode="auto">
+          <a:xfrm>
+            <a:off x="751441" y="1030115"/>
+            <a:ext cx="3820559" cy="5278880"/>
+          </a:xfrm>
+          <a:prstGeom prst="rect">
+            <a:avLst/>
+          </a:prstGeom>
+          <a:noFill/>
+          <a:extLst>
+            <a:ext uri="{909E8E84-426E-40DD-AFC4-6F175D3DCCD1}">
+              <a14:hiddenFill xmlns:a14="http://schemas.microsoft.com/office/drawing/2010/main">
+                <a:solidFill>
+                  <a:srgbClr val="FFFFFF"/>
+                </a:solidFill>
+              </a14:hiddenFill>
+            </a:ext>
+          </a:extLst>
+        </p:spPr>
+      </p:pic>
+    </p:spTree>
+    <p:extLst>
+      <p:ext uri="{BB962C8B-B14F-4D97-AF65-F5344CB8AC3E}">
+        <p14:creationId xmlns:p14="http://schemas.microsoft.com/office/powerpoint/2010/main" val="2985984650"/>
+      </p:ext>
+    </p:extLst>
+  </p:cSld>
+  <p:clrMapOvr>
+    <a:masterClrMapping/>
+  </p:clrMapOvr>
+</p:sld>
+</file>
+
+<file path=ppt/slides/slide15.xml><?xml version="1.0" encoding="utf-8"?>
 <p:sld xmlns:a="http://schemas.openxmlformats.org/drawingml/2006/main" xmlns:r="http://schemas.openxmlformats.org/officeDocument/2006/relationships" xmlns:p="http://schemas.openxmlformats.org/presentationml/2006/main">
   <p:cSld>
     <p:spTree>

</xml_diff>